<commit_message>
changed database related slide in pptx
</commit_message>
<xml_diff>
--- a/delivers/THE PLAYLIST.pptx
+++ b/delivers/THE PLAYLIST.pptx
@@ -295,7 +295,7 @@
           <a:p>
             <a:fld id="{444E331B-3509-4A7F-9C4E-45F5BC11C182}" type="datetimeFigureOut">
               <a:rPr lang="it-IT" smtClean="0"/>
-              <a:t>05/05/2023</a:t>
+              <a:t>07/05/2023</a:t>
             </a:fld>
             <a:endParaRPr lang="it-IT"/>
           </a:p>
@@ -493,7 +493,7 @@
           <a:p>
             <a:fld id="{444E331B-3509-4A7F-9C4E-45F5BC11C182}" type="datetimeFigureOut">
               <a:rPr lang="it-IT" smtClean="0"/>
-              <a:t>05/05/2023</a:t>
+              <a:t>07/05/2023</a:t>
             </a:fld>
             <a:endParaRPr lang="it-IT"/>
           </a:p>
@@ -701,7 +701,7 @@
           <a:p>
             <a:fld id="{444E331B-3509-4A7F-9C4E-45F5BC11C182}" type="datetimeFigureOut">
               <a:rPr lang="it-IT" smtClean="0"/>
-              <a:t>05/05/2023</a:t>
+              <a:t>07/05/2023</a:t>
             </a:fld>
             <a:endParaRPr lang="it-IT"/>
           </a:p>
@@ -899,7 +899,7 @@
           <a:p>
             <a:fld id="{444E331B-3509-4A7F-9C4E-45F5BC11C182}" type="datetimeFigureOut">
               <a:rPr lang="it-IT" smtClean="0"/>
-              <a:t>05/05/2023</a:t>
+              <a:t>07/05/2023</a:t>
             </a:fld>
             <a:endParaRPr lang="it-IT"/>
           </a:p>
@@ -1174,7 +1174,7 @@
           <a:p>
             <a:fld id="{444E331B-3509-4A7F-9C4E-45F5BC11C182}" type="datetimeFigureOut">
               <a:rPr lang="it-IT" smtClean="0"/>
-              <a:t>05/05/2023</a:t>
+              <a:t>07/05/2023</a:t>
             </a:fld>
             <a:endParaRPr lang="it-IT"/>
           </a:p>
@@ -1439,7 +1439,7 @@
           <a:p>
             <a:fld id="{444E331B-3509-4A7F-9C4E-45F5BC11C182}" type="datetimeFigureOut">
               <a:rPr lang="it-IT" smtClean="0"/>
-              <a:t>05/05/2023</a:t>
+              <a:t>07/05/2023</a:t>
             </a:fld>
             <a:endParaRPr lang="it-IT"/>
           </a:p>
@@ -1851,7 +1851,7 @@
           <a:p>
             <a:fld id="{444E331B-3509-4A7F-9C4E-45F5BC11C182}" type="datetimeFigureOut">
               <a:rPr lang="it-IT" smtClean="0"/>
-              <a:t>05/05/2023</a:t>
+              <a:t>07/05/2023</a:t>
             </a:fld>
             <a:endParaRPr lang="it-IT"/>
           </a:p>
@@ -1992,7 +1992,7 @@
           <a:p>
             <a:fld id="{444E331B-3509-4A7F-9C4E-45F5BC11C182}" type="datetimeFigureOut">
               <a:rPr lang="it-IT" smtClean="0"/>
-              <a:t>05/05/2023</a:t>
+              <a:t>07/05/2023</a:t>
             </a:fld>
             <a:endParaRPr lang="it-IT"/>
           </a:p>
@@ -2105,7 +2105,7 @@
           <a:p>
             <a:fld id="{444E331B-3509-4A7F-9C4E-45F5BC11C182}" type="datetimeFigureOut">
               <a:rPr lang="it-IT" smtClean="0"/>
-              <a:t>05/05/2023</a:t>
+              <a:t>07/05/2023</a:t>
             </a:fld>
             <a:endParaRPr lang="it-IT"/>
           </a:p>
@@ -2416,7 +2416,7 @@
           <a:p>
             <a:fld id="{444E331B-3509-4A7F-9C4E-45F5BC11C182}" type="datetimeFigureOut">
               <a:rPr lang="it-IT" smtClean="0"/>
-              <a:t>05/05/2023</a:t>
+              <a:t>07/05/2023</a:t>
             </a:fld>
             <a:endParaRPr lang="it-IT"/>
           </a:p>
@@ -2704,7 +2704,7 @@
           <a:p>
             <a:fld id="{444E331B-3509-4A7F-9C4E-45F5BC11C182}" type="datetimeFigureOut">
               <a:rPr lang="it-IT" smtClean="0"/>
-              <a:t>05/05/2023</a:t>
+              <a:t>07/05/2023</a:t>
             </a:fld>
             <a:endParaRPr lang="it-IT"/>
           </a:p>
@@ -2948,7 +2948,7 @@
           <a:p>
             <a:fld id="{444E331B-3509-4A7F-9C4E-45F5BC11C182}" type="datetimeFigureOut">
               <a:rPr lang="it-IT" smtClean="0"/>
-              <a:t>05/05/2023</a:t>
+              <a:t>07/05/2023</a:t>
             </a:fld>
             <a:endParaRPr lang="it-IT"/>
           </a:p>
@@ -10077,174 +10077,6 @@
       </p:cxnSp>
       <p:sp>
         <p:nvSpPr>
-          <p:cNvPr id="28" name="CasellaDiTesto 27">
-            <a:extLst>
-              <a:ext uri="{FF2B5EF4-FFF2-40B4-BE49-F238E27FC236}">
-                <a16:creationId xmlns:a16="http://schemas.microsoft.com/office/drawing/2014/main" id="{69073A8C-C1AD-8115-70D8-EB4282579A88}"/>
-              </a:ext>
-            </a:extLst>
-          </p:cNvPr>
-          <p:cNvSpPr txBox="1"/>
-          <p:nvPr/>
-        </p:nvSpPr>
-        <p:spPr>
-          <a:xfrm>
-            <a:off x="10496554" y="2559722"/>
-            <a:ext cx="707951" cy="338554"/>
-          </a:xfrm>
-          <a:prstGeom prst="rect">
-            <a:avLst/>
-          </a:prstGeom>
-          <a:noFill/>
-        </p:spPr>
-        <p:txBody>
-          <a:bodyPr wrap="square" rtlCol="0">
-            <a:spAutoFit/>
-          </a:bodyPr>
-          <a:lstStyle/>
-          <a:p>
-            <a:r>
-              <a:rPr lang="it-IT" sz="1600" dirty="0">
-                <a:solidFill>
-                  <a:schemeClr val="bg1"/>
-                </a:solidFill>
-              </a:rPr>
-              <a:t>User</a:t>
-            </a:r>
-          </a:p>
-        </p:txBody>
-      </p:sp>
-      <p:cxnSp>
-        <p:nvCxnSpPr>
-          <p:cNvPr id="29" name="Connettore diritto 28">
-            <a:extLst>
-              <a:ext uri="{FF2B5EF4-FFF2-40B4-BE49-F238E27FC236}">
-                <a16:creationId xmlns:a16="http://schemas.microsoft.com/office/drawing/2014/main" id="{211F254E-DD23-7765-4E9D-0C4EE93AD52A}"/>
-              </a:ext>
-            </a:extLst>
-          </p:cNvPr>
-          <p:cNvCxnSpPr>
-            <a:cxnSpLocks/>
-            <a:stCxn id="28" idx="1"/>
-          </p:cNvCxnSpPr>
-          <p:nvPr/>
-        </p:nvCxnSpPr>
-        <p:spPr>
-          <a:xfrm flipH="1">
-            <a:off x="9963265" y="2728999"/>
-            <a:ext cx="533289" cy="0"/>
-          </a:xfrm>
-          <a:prstGeom prst="line">
-            <a:avLst/>
-          </a:prstGeom>
-          <a:ln w="38100">
-            <a:solidFill>
-              <a:srgbClr val="1DB954"/>
-            </a:solidFill>
-            <a:headEnd type="oval"/>
-          </a:ln>
-        </p:spPr>
-        <p:style>
-          <a:lnRef idx="1">
-            <a:schemeClr val="accent1"/>
-          </a:lnRef>
-          <a:fillRef idx="0">
-            <a:schemeClr val="accent1"/>
-          </a:fillRef>
-          <a:effectRef idx="0">
-            <a:schemeClr val="accent1"/>
-          </a:effectRef>
-          <a:fontRef idx="minor">
-            <a:schemeClr val="tx1"/>
-          </a:fontRef>
-        </p:style>
-      </p:cxnSp>
-      <p:sp>
-        <p:nvSpPr>
-          <p:cNvPr id="30" name="CasellaDiTesto 29">
-            <a:extLst>
-              <a:ext uri="{FF2B5EF4-FFF2-40B4-BE49-F238E27FC236}">
-                <a16:creationId xmlns:a16="http://schemas.microsoft.com/office/drawing/2014/main" id="{E4A47E82-9F07-AB5E-632A-42ACFD8F6442}"/>
-              </a:ext>
-            </a:extLst>
-          </p:cNvPr>
-          <p:cNvSpPr txBox="1"/>
-          <p:nvPr/>
-        </p:nvSpPr>
-        <p:spPr>
-          <a:xfrm>
-            <a:off x="10496555" y="2925147"/>
-            <a:ext cx="802812" cy="338554"/>
-          </a:xfrm>
-          <a:prstGeom prst="rect">
-            <a:avLst/>
-          </a:prstGeom>
-          <a:noFill/>
-        </p:spPr>
-        <p:txBody>
-          <a:bodyPr wrap="square" rtlCol="0">
-            <a:spAutoFit/>
-          </a:bodyPr>
-          <a:lstStyle/>
-          <a:p>
-            <a:r>
-              <a:rPr lang="it-IT" sz="1600" dirty="0">
-                <a:solidFill>
-                  <a:schemeClr val="bg1"/>
-                </a:solidFill>
-              </a:rPr>
-              <a:t>Album</a:t>
-            </a:r>
-          </a:p>
-        </p:txBody>
-      </p:sp>
-      <p:cxnSp>
-        <p:nvCxnSpPr>
-          <p:cNvPr id="31" name="Connettore diritto 30">
-            <a:extLst>
-              <a:ext uri="{FF2B5EF4-FFF2-40B4-BE49-F238E27FC236}">
-                <a16:creationId xmlns:a16="http://schemas.microsoft.com/office/drawing/2014/main" id="{2ADE5014-70D5-7863-3C1B-9A441CA84CDE}"/>
-              </a:ext>
-            </a:extLst>
-          </p:cNvPr>
-          <p:cNvCxnSpPr>
-            <a:cxnSpLocks/>
-            <a:stCxn id="30" idx="1"/>
-          </p:cNvCxnSpPr>
-          <p:nvPr/>
-        </p:nvCxnSpPr>
-        <p:spPr>
-          <a:xfrm flipH="1">
-            <a:off x="9963265" y="3094424"/>
-            <a:ext cx="533290" cy="0"/>
-          </a:xfrm>
-          <a:prstGeom prst="line">
-            <a:avLst/>
-          </a:prstGeom>
-          <a:ln w="38100">
-            <a:solidFill>
-              <a:srgbClr val="1DB954"/>
-            </a:solidFill>
-            <a:headEnd type="oval"/>
-          </a:ln>
-        </p:spPr>
-        <p:style>
-          <a:lnRef idx="1">
-            <a:schemeClr val="accent1"/>
-          </a:lnRef>
-          <a:fillRef idx="0">
-            <a:schemeClr val="accent1"/>
-          </a:fillRef>
-          <a:effectRef idx="0">
-            <a:schemeClr val="accent1"/>
-          </a:effectRef>
-          <a:fontRef idx="minor">
-            <a:schemeClr val="tx1"/>
-          </a:fontRef>
-        </p:style>
-      </p:cxnSp>
-      <p:sp>
-        <p:nvSpPr>
           <p:cNvPr id="130" name="Rettangolo 129">
             <a:extLst>
               <a:ext uri="{FF2B5EF4-FFF2-40B4-BE49-F238E27FC236}">
@@ -11519,8 +11351,8 @@
         </p:nvSpPr>
         <p:spPr>
           <a:xfrm>
-            <a:off x="7274717" y="2204152"/>
-            <a:ext cx="324315" cy="369332"/>
+            <a:off x="7068549" y="2204152"/>
+            <a:ext cx="530484" cy="369332"/>
           </a:xfrm>
           <a:prstGeom prst="rect">
             <a:avLst/>
@@ -11546,7 +11378,7 @@
                   </a:outerShdw>
                 </a:effectLst>
               </a:rPr>
-              <a:t>1</a:t>
+              <a:t>1:1</a:t>
             </a:r>
           </a:p>
         </p:txBody>
@@ -11704,7 +11536,7 @@
         <p:spPr>
           <a:xfrm>
             <a:off x="8892619" y="3112117"/>
-            <a:ext cx="324315" cy="369332"/>
+            <a:ext cx="510553" cy="369332"/>
           </a:xfrm>
           <a:prstGeom prst="rect">
             <a:avLst/>
@@ -11730,7 +11562,7 @@
                   </a:outerShdw>
                 </a:effectLst>
               </a:rPr>
-              <a:t>1</a:t>
+              <a:t>1:1</a:t>
             </a:r>
           </a:p>
         </p:txBody>
@@ -12427,12 +12259,20 @@
               <a:buChar char="§"/>
             </a:pPr>
             <a:r>
+              <a:rPr lang="it-IT" dirty="0" err="1">
+                <a:solidFill>
+                  <a:schemeClr val="bg1"/>
+                </a:solidFill>
+              </a:rPr>
+              <a:t>Playlist.UserName</a:t>
+            </a:r>
+            <a:r>
               <a:rPr lang="it-IT" dirty="0">
                 <a:solidFill>
                   <a:schemeClr val="bg1"/>
                 </a:solidFill>
               </a:rPr>
-              <a:t>Playlist.User </a:t>
+              <a:t> </a:t>
             </a:r>
             <a:r>
               <a:rPr lang="it-IT" sz="1600" dirty="0">
@@ -12448,7 +12288,7 @@
                   <a:schemeClr val="bg1"/>
                 </a:solidFill>
               </a:rPr>
-              <a:t>User.Name</a:t>
+              <a:t>User.UserName</a:t>
             </a:r>
             <a:endParaRPr lang="it-IT" dirty="0">
               <a:solidFill>
@@ -12483,7 +12323,7 @@
                   <a:schemeClr val="bg1"/>
                 </a:solidFill>
               </a:rPr>
-              <a:t>Usern.Name</a:t>
+              <a:t>User.UserName</a:t>
             </a:r>
             <a:endParaRPr lang="it-IT" dirty="0">
               <a:solidFill>
@@ -13664,8 +13504,103 @@
             </a:p>
             <a:p>
               <a:pPr marL="285750" indent="-285750">
-                <a:buFont typeface="Courier New" panose="02070309020205020404" pitchFamily="49" charset="0"/>
-                <a:buChar char="o"/>
+                <a:buFont typeface="Calibri" panose="020F0502020204030204" pitchFamily="34" charset="0"/>
+                <a:buChar char="−"/>
+              </a:pPr>
+              <a:r>
+                <a:rPr lang="it-IT" dirty="0" err="1">
+                  <a:solidFill>
+                    <a:schemeClr val="bg1"/>
+                  </a:solidFill>
+                </a:rPr>
+                <a:t>addPlaylist</a:t>
+              </a:r>
+              <a:endParaRPr lang="it-IT" dirty="0">
+                <a:solidFill>
+                  <a:schemeClr val="bg1"/>
+                </a:solidFill>
+              </a:endParaRPr>
+            </a:p>
+            <a:p>
+              <a:pPr marL="285750" indent="-285750">
+                <a:buFont typeface="Calibri" panose="020F0502020204030204" pitchFamily="34" charset="0"/>
+                <a:buChar char="−"/>
+              </a:pPr>
+              <a:r>
+                <a:rPr lang="it-IT" dirty="0" err="1">
+                  <a:solidFill>
+                    <a:schemeClr val="bg1"/>
+                  </a:solidFill>
+                </a:rPr>
+                <a:t>songAlreadyIn</a:t>
+              </a:r>
+              <a:endParaRPr lang="it-IT" dirty="0">
+                <a:solidFill>
+                  <a:schemeClr val="bg1"/>
+                </a:solidFill>
+              </a:endParaRPr>
+            </a:p>
+            <a:p>
+              <a:pPr marL="285750" indent="-285750">
+                <a:buFont typeface="Calibri" panose="020F0502020204030204" pitchFamily="34" charset="0"/>
+                <a:buChar char="+"/>
+              </a:pPr>
+              <a:r>
+                <a:rPr lang="it-IT" dirty="0" err="1">
+                  <a:solidFill>
+                    <a:schemeClr val="bg1"/>
+                  </a:solidFill>
+                </a:rPr>
+                <a:t>addSongToPlaylist</a:t>
+              </a:r>
+              <a:endParaRPr lang="it-IT" dirty="0">
+                <a:solidFill>
+                  <a:schemeClr val="bg1"/>
+                </a:solidFill>
+              </a:endParaRPr>
+            </a:p>
+            <a:p>
+              <a:pPr marL="285750" indent="-285750">
+                <a:buFont typeface="Calibri" panose="020F0502020204030204" pitchFamily="34" charset="0"/>
+                <a:buChar char="+"/>
+              </a:pPr>
+              <a:r>
+                <a:rPr lang="it-IT" dirty="0" err="1">
+                  <a:solidFill>
+                    <a:schemeClr val="bg1"/>
+                  </a:solidFill>
+                </a:rPr>
+                <a:t>addPlaylistWithSongs</a:t>
+              </a:r>
+              <a:endParaRPr lang="it-IT" dirty="0">
+                <a:solidFill>
+                  <a:schemeClr val="bg1"/>
+                </a:solidFill>
+              </a:endParaRPr>
+            </a:p>
+            <a:p>
+              <a:pPr marL="285750" indent="-285750">
+                <a:buFont typeface="Calibri" panose="020F0502020204030204" pitchFamily="34" charset="0"/>
+                <a:buChar char="+"/>
+              </a:pPr>
+              <a:r>
+                <a:rPr lang="it-IT" dirty="0" err="1">
+                  <a:solidFill>
+                    <a:schemeClr val="bg1"/>
+                  </a:solidFill>
+                </a:rPr>
+                <a:t>belongTo</a:t>
+              </a:r>
+              <a:endParaRPr lang="it-IT" dirty="0">
+                <a:solidFill>
+                  <a:schemeClr val="bg1"/>
+                </a:solidFill>
+              </a:endParaRPr>
+            </a:p>
+            <a:p>
+              <a:pPr marL="285750" indent="-285750">
+                <a:buFont typeface="Calibri" panose="020F0502020204030204" pitchFamily="34" charset="0"/>
+                <a:buChar char="+"/>
               </a:pPr>
               <a:r>
                 <a:rPr lang="it-IT" dirty="0" err="1">
@@ -13683,8 +13618,8 @@
             </a:p>
             <a:p>
               <a:pPr marL="285750" indent="-285750">
-                <a:buFont typeface="Courier New" panose="02070309020205020404" pitchFamily="49" charset="0"/>
-                <a:buChar char="o"/>
+                <a:buFont typeface="Calibri" panose="020F0502020204030204" pitchFamily="34" charset="0"/>
+                <a:buChar char="+"/>
               </a:pPr>
               <a:r>
                 <a:rPr lang="it-IT" dirty="0" err="1">
@@ -13693,101 +13628,6 @@
                   </a:solidFill>
                 </a:rPr>
                 <a:t>taken</a:t>
-              </a:r>
-              <a:endParaRPr lang="it-IT" dirty="0">
-                <a:solidFill>
-                  <a:schemeClr val="bg1"/>
-                </a:solidFill>
-              </a:endParaRPr>
-            </a:p>
-            <a:p>
-              <a:pPr marL="285750" indent="-285750">
-                <a:buFont typeface="Courier New" panose="02070309020205020404" pitchFamily="49" charset="0"/>
-                <a:buChar char="o"/>
-              </a:pPr>
-              <a:r>
-                <a:rPr lang="it-IT" dirty="0" err="1">
-                  <a:solidFill>
-                    <a:schemeClr val="bg1"/>
-                  </a:solidFill>
-                </a:rPr>
-                <a:t>addPlaylist</a:t>
-              </a:r>
-              <a:endParaRPr lang="it-IT" dirty="0">
-                <a:solidFill>
-                  <a:schemeClr val="bg1"/>
-                </a:solidFill>
-              </a:endParaRPr>
-            </a:p>
-            <a:p>
-              <a:pPr marL="285750" indent="-285750">
-                <a:buFont typeface="Courier New" panose="02070309020205020404" pitchFamily="49" charset="0"/>
-                <a:buChar char="o"/>
-              </a:pPr>
-              <a:r>
-                <a:rPr lang="it-IT" dirty="0" err="1">
-                  <a:solidFill>
-                    <a:schemeClr val="bg1"/>
-                  </a:solidFill>
-                </a:rPr>
-                <a:t>songAlreadyIn</a:t>
-              </a:r>
-              <a:endParaRPr lang="it-IT" dirty="0">
-                <a:solidFill>
-                  <a:schemeClr val="bg1"/>
-                </a:solidFill>
-              </a:endParaRPr>
-            </a:p>
-            <a:p>
-              <a:pPr marL="285750" indent="-285750">
-                <a:buFont typeface="Courier New" panose="02070309020205020404" pitchFamily="49" charset="0"/>
-                <a:buChar char="o"/>
-              </a:pPr>
-              <a:r>
-                <a:rPr lang="it-IT" dirty="0" err="1">
-                  <a:solidFill>
-                    <a:schemeClr val="bg1"/>
-                  </a:solidFill>
-                </a:rPr>
-                <a:t>addSongToPlaylist</a:t>
-              </a:r>
-              <a:endParaRPr lang="it-IT" dirty="0">
-                <a:solidFill>
-                  <a:schemeClr val="bg1"/>
-                </a:solidFill>
-              </a:endParaRPr>
-            </a:p>
-            <a:p>
-              <a:pPr marL="285750" indent="-285750">
-                <a:buFont typeface="Courier New" panose="02070309020205020404" pitchFamily="49" charset="0"/>
-                <a:buChar char="o"/>
-              </a:pPr>
-              <a:r>
-                <a:rPr lang="it-IT" dirty="0" err="1">
-                  <a:solidFill>
-                    <a:schemeClr val="bg1"/>
-                  </a:solidFill>
-                </a:rPr>
-                <a:t>addPlaylistWithSongs</a:t>
-              </a:r>
-              <a:endParaRPr lang="it-IT" dirty="0">
-                <a:solidFill>
-                  <a:schemeClr val="bg1"/>
-                </a:solidFill>
-              </a:endParaRPr>
-            </a:p>
-            <a:p>
-              <a:pPr marL="285750" indent="-285750">
-                <a:buFont typeface="Courier New" panose="02070309020205020404" pitchFamily="49" charset="0"/>
-                <a:buChar char="o"/>
-              </a:pPr>
-              <a:r>
-                <a:rPr lang="it-IT" dirty="0" err="1">
-                  <a:solidFill>
-                    <a:schemeClr val="bg1"/>
-                  </a:solidFill>
-                </a:rPr>
-                <a:t>belongTo</a:t>
               </a:r>
               <a:endParaRPr lang="it-IT" dirty="0">
                 <a:solidFill>
@@ -13836,8 +13676,8 @@
             </a:p>
             <a:p>
               <a:pPr marL="285750" indent="-285750">
-                <a:buFont typeface="Courier New" panose="02070309020205020404" pitchFamily="49" charset="0"/>
-                <a:buChar char="o"/>
+                <a:buFont typeface="Calibri" panose="020F0502020204030204" pitchFamily="34" charset="0"/>
+                <a:buChar char="−"/>
               </a:pPr>
               <a:r>
                 <a:rPr lang="it-IT" dirty="0" err="1">
@@ -13855,8 +13695,8 @@
             </a:p>
             <a:p>
               <a:pPr marL="285750" indent="-285750">
-                <a:buFont typeface="Courier New" panose="02070309020205020404" pitchFamily="49" charset="0"/>
-                <a:buChar char="o"/>
+                <a:buFont typeface="Calibri" panose="020F0502020204030204" pitchFamily="34" charset="0"/>
+                <a:buChar char="+"/>
               </a:pPr>
               <a:r>
                 <a:rPr lang="it-IT" dirty="0">
@@ -13869,8 +13709,8 @@
             </a:p>
             <a:p>
               <a:pPr marL="285750" indent="-285750">
-                <a:buFont typeface="Courier New" panose="02070309020205020404" pitchFamily="49" charset="0"/>
-                <a:buChar char="o"/>
+                <a:buFont typeface="Calibri" panose="020F0502020204030204" pitchFamily="34" charset="0"/>
+                <a:buChar char="+"/>
               </a:pPr>
               <a:r>
                 <a:rPr lang="it-IT" dirty="0" err="1">
@@ -13927,8 +13767,8 @@
             </a:p>
             <a:p>
               <a:pPr marL="342900" indent="-342900">
-                <a:buFont typeface="Courier New" panose="02070309020205020404" pitchFamily="49" charset="0"/>
-                <a:buChar char="o"/>
+                <a:buFont typeface="Calibri" panose="020F0502020204030204" pitchFamily="34" charset="0"/>
+                <a:buChar char="−"/>
               </a:pPr>
               <a:r>
                 <a:rPr lang="it-IT" dirty="0" err="1">
@@ -13946,8 +13786,8 @@
             </a:p>
             <a:p>
               <a:pPr marL="342900" indent="-342900">
-                <a:buFont typeface="Courier New" panose="02070309020205020404" pitchFamily="49" charset="0"/>
-                <a:buChar char="o"/>
+                <a:buFont typeface="Calibri" panose="020F0502020204030204" pitchFamily="34" charset="0"/>
+                <a:buChar char="−"/>
               </a:pPr>
               <a:r>
                 <a:rPr lang="it-IT" dirty="0" err="1">
@@ -13965,8 +13805,8 @@
             </a:p>
             <a:p>
               <a:pPr marL="342900" indent="-342900">
-                <a:buFont typeface="Courier New" panose="02070309020205020404" pitchFamily="49" charset="0"/>
-                <a:buChar char="o"/>
+                <a:buFont typeface="Calibri" panose="020F0502020204030204" pitchFamily="34" charset="0"/>
+                <a:buChar char="−"/>
               </a:pPr>
               <a:r>
                 <a:rPr lang="it-IT" dirty="0" err="1">
@@ -13984,8 +13824,8 @@
             </a:p>
             <a:p>
               <a:pPr marL="342900" indent="-342900">
-                <a:buFont typeface="Courier New" panose="02070309020205020404" pitchFamily="49" charset="0"/>
-                <a:buChar char="o"/>
+                <a:buFont typeface="Calibri" panose="020F0502020204030204" pitchFamily="34" charset="0"/>
+                <a:buChar char="−"/>
               </a:pPr>
               <a:r>
                 <a:rPr lang="it-IT" dirty="0" err="1">
@@ -14003,8 +13843,8 @@
             </a:p>
             <a:p>
               <a:pPr marL="342900" indent="-342900">
-                <a:buFont typeface="Courier New" panose="02070309020205020404" pitchFamily="49" charset="0"/>
-                <a:buChar char="o"/>
+                <a:buFont typeface="Calibri" panose="020F0502020204030204" pitchFamily="34" charset="0"/>
+                <a:buChar char="+"/>
               </a:pPr>
               <a:r>
                 <a:rPr lang="it-IT" dirty="0" err="1">
@@ -14022,8 +13862,8 @@
             </a:p>
             <a:p>
               <a:pPr marL="342900" indent="-342900">
-                <a:buFont typeface="Courier New" panose="02070309020205020404" pitchFamily="49" charset="0"/>
-                <a:buChar char="o"/>
+                <a:buFont typeface="Calibri" panose="020F0502020204030204" pitchFamily="34" charset="0"/>
+                <a:buChar char="+"/>
               </a:pPr>
               <a:r>
                 <a:rPr lang="it-IT" dirty="0" err="1">
@@ -14041,8 +13881,8 @@
             </a:p>
             <a:p>
               <a:pPr marL="342900" indent="-342900">
-                <a:buFont typeface="Courier New" panose="02070309020205020404" pitchFamily="49" charset="0"/>
-                <a:buChar char="o"/>
+                <a:buFont typeface="Calibri" panose="020F0502020204030204" pitchFamily="34" charset="0"/>
+                <a:buChar char="+"/>
               </a:pPr>
               <a:r>
                 <a:rPr lang="it-IT" dirty="0" err="1">
@@ -14060,8 +13900,8 @@
             </a:p>
             <a:p>
               <a:pPr marL="342900" indent="-342900">
-                <a:buFont typeface="Courier New" panose="02070309020205020404" pitchFamily="49" charset="0"/>
-                <a:buChar char="o"/>
+                <a:buFont typeface="Calibri" panose="020F0502020204030204" pitchFamily="34" charset="0"/>
+                <a:buChar char="+"/>
               </a:pPr>
               <a:r>
                 <a:rPr lang="it-IT" dirty="0" err="1">
@@ -14079,8 +13919,8 @@
             </a:p>
             <a:p>
               <a:pPr marL="342900" indent="-342900">
-                <a:buFont typeface="Courier New" panose="02070309020205020404" pitchFamily="49" charset="0"/>
-                <a:buChar char="o"/>
+                <a:buFont typeface="Calibri" panose="020F0502020204030204" pitchFamily="34" charset="0"/>
+                <a:buChar char="+"/>
               </a:pPr>
               <a:r>
                 <a:rPr lang="it-IT" dirty="0" err="1">
@@ -14098,8 +13938,8 @@
             </a:p>
             <a:p>
               <a:pPr marL="342900" indent="-342900">
-                <a:buFont typeface="Courier New" panose="02070309020205020404" pitchFamily="49" charset="0"/>
-                <a:buChar char="o"/>
+                <a:buFont typeface="Calibri" panose="020F0502020204030204" pitchFamily="34" charset="0"/>
+                <a:buChar char="+"/>
               </a:pPr>
               <a:r>
                 <a:rPr lang="it-IT" dirty="0" err="1">
@@ -14117,8 +13957,8 @@
             </a:p>
             <a:p>
               <a:pPr marL="342900" indent="-342900">
-                <a:buFont typeface="Courier New" panose="02070309020205020404" pitchFamily="49" charset="0"/>
-                <a:buChar char="o"/>
+                <a:buFont typeface="Calibri" panose="020F0502020204030204" pitchFamily="34" charset="0"/>
+                <a:buChar char="+"/>
               </a:pPr>
               <a:r>
                 <a:rPr lang="it-IT" dirty="0" err="1">
@@ -14136,8 +13976,8 @@
             </a:p>
             <a:p>
               <a:pPr marL="342900" indent="-342900">
-                <a:buFont typeface="Courier New" panose="02070309020205020404" pitchFamily="49" charset="0"/>
-                <a:buChar char="o"/>
+                <a:buFont typeface="Calibri" panose="020F0502020204030204" pitchFamily="34" charset="0"/>
+                <a:buChar char="+"/>
               </a:pPr>
               <a:r>
                 <a:rPr lang="it-IT" dirty="0" err="1">
@@ -14155,8 +13995,8 @@
             </a:p>
             <a:p>
               <a:pPr marL="342900" indent="-342900">
-                <a:buFont typeface="Courier New" panose="02070309020205020404" pitchFamily="49" charset="0"/>
-                <a:buChar char="o"/>
+                <a:buFont typeface="Calibri" panose="020F0502020204030204" pitchFamily="34" charset="0"/>
+                <a:buChar char="+"/>
               </a:pPr>
               <a:r>
                 <a:rPr lang="it-IT" dirty="0" err="1">
@@ -14495,6 +14335,23 @@
 </file>
 
 <file path=customXml/item1.xml><?xml version="1.0" encoding="utf-8"?>
+<p:properties xmlns:p="http://schemas.microsoft.com/office/2006/metadata/properties" xmlns:xsi="http://www.w3.org/2001/XMLSchema-instance" xmlns:pc="http://schemas.microsoft.com/office/infopath/2007/PartnerControls">
+  <documentManagement>
+    <_activity xmlns="68f14a89-5ccd-4d49-ad62-26850b52acdb" xsi:nil="true"/>
+  </documentManagement>
+</p:properties>
+</file>
+
+<file path=customXml/item2.xml><?xml version="1.0" encoding="utf-8"?>
+<?mso-contentType ?>
+<FormTemplates xmlns="http://schemas.microsoft.com/sharepoint/v3/contenttype/forms">
+  <Display>DocumentLibraryForm</Display>
+  <Edit>DocumentLibraryForm</Edit>
+  <New>DocumentLibraryForm</New>
+</FormTemplates>
+</file>
+
+<file path=customXml/item3.xml><?xml version="1.0" encoding="utf-8"?>
 <ct:contentTypeSchema xmlns:ct="http://schemas.microsoft.com/office/2006/metadata/contentType" xmlns:ma="http://schemas.microsoft.com/office/2006/metadata/properties/metaAttributes" ct:_="" ma:_="" ma:contentTypeName="Documento" ma:contentTypeID="0x010100A755C5507E714C48937709EDB0DFB052" ma:contentTypeVersion="10" ma:contentTypeDescription="Creare un nuovo documento." ma:contentTypeScope="" ma:versionID="1b3c7f236d80fd1b926b1eea7a94ba76">
   <xsd:schema xmlns:xsd="http://www.w3.org/2001/XMLSchema" xmlns:xs="http://www.w3.org/2001/XMLSchema" xmlns:p="http://schemas.microsoft.com/office/2006/metadata/properties" xmlns:ns3="68f14a89-5ccd-4d49-ad62-26850b52acdb" targetNamespace="http://schemas.microsoft.com/office/2006/metadata/properties" ma:root="true" ma:fieldsID="12a2da776ba7f20303e1a452ea5f200c" ns3:_="">
     <xsd:import namespace="68f14a89-5ccd-4d49-ad62-26850b52acdb"/>
@@ -14676,24 +14533,31 @@
 </ct:contentTypeSchema>
 </file>
 
-<file path=customXml/item2.xml><?xml version="1.0" encoding="utf-8"?>
-<?mso-contentType ?>
-<FormTemplates xmlns="http://schemas.microsoft.com/sharepoint/v3/contenttype/forms">
-  <Display>DocumentLibraryForm</Display>
-  <Edit>DocumentLibraryForm</Edit>
-  <New>DocumentLibraryForm</New>
-</FormTemplates>
+<file path=customXml/itemProps1.xml><?xml version="1.0" encoding="utf-8"?>
+<ds:datastoreItem xmlns:ds="http://schemas.openxmlformats.org/officeDocument/2006/customXml" ds:itemID="{8C35085A-48E6-432D-BE61-01DE8B0FD0D2}">
+  <ds:schemaRefs>
+    <ds:schemaRef ds:uri="http://purl.org/dc/elements/1.1/"/>
+    <ds:schemaRef ds:uri="http://schemas.microsoft.com/office/2006/documentManagement/types"/>
+    <ds:schemaRef ds:uri="http://schemas.openxmlformats.org/package/2006/metadata/core-properties"/>
+    <ds:schemaRef ds:uri="http://schemas.microsoft.com/office/2006/metadata/properties"/>
+    <ds:schemaRef ds:uri="http://purl.org/dc/dcmitype/"/>
+    <ds:schemaRef ds:uri="http://purl.org/dc/terms/"/>
+    <ds:schemaRef ds:uri="http://www.w3.org/XML/1998/namespace"/>
+    <ds:schemaRef ds:uri="http://schemas.microsoft.com/office/infopath/2007/PartnerControls"/>
+    <ds:schemaRef ds:uri="68f14a89-5ccd-4d49-ad62-26850b52acdb"/>
+  </ds:schemaRefs>
+</ds:datastoreItem>
 </file>
 
-<file path=customXml/item3.xml><?xml version="1.0" encoding="utf-8"?>
-<p:properties xmlns:p="http://schemas.microsoft.com/office/2006/metadata/properties" xmlns:xsi="http://www.w3.org/2001/XMLSchema-instance" xmlns:pc="http://schemas.microsoft.com/office/infopath/2007/PartnerControls">
-  <documentManagement>
-    <_activity xmlns="68f14a89-5ccd-4d49-ad62-26850b52acdb" xsi:nil="true"/>
-  </documentManagement>
-</p:properties>
+<file path=customXml/itemProps2.xml><?xml version="1.0" encoding="utf-8"?>
+<ds:datastoreItem xmlns:ds="http://schemas.openxmlformats.org/officeDocument/2006/customXml" ds:itemID="{CFD5F93E-8B05-4FD5-A342-A9262D25EBF5}">
+  <ds:schemaRefs>
+    <ds:schemaRef ds:uri="http://schemas.microsoft.com/sharepoint/v3/contenttype/forms"/>
+  </ds:schemaRefs>
+</ds:datastoreItem>
 </file>
 
-<file path=customXml/itemProps1.xml><?xml version="1.0" encoding="utf-8"?>
+<file path=customXml/itemProps3.xml><?xml version="1.0" encoding="utf-8"?>
 <ds:datastoreItem xmlns:ds="http://schemas.openxmlformats.org/officeDocument/2006/customXml" ds:itemID="{30345D1D-2444-4EA9-8C58-F9E27582F734}">
   <ds:schemaRefs>
     <ds:schemaRef ds:uri="http://schemas.microsoft.com/office/2006/metadata/contentType"/>
@@ -14709,28 +14573,4 @@
     <ds:schemaRef ds:uri="http://schemas.microsoft.com/internal/obd"/>
   </ds:schemaRefs>
 </ds:datastoreItem>
-</file>
-
-<file path=customXml/itemProps2.xml><?xml version="1.0" encoding="utf-8"?>
-<ds:datastoreItem xmlns:ds="http://schemas.openxmlformats.org/officeDocument/2006/customXml" ds:itemID="{CFD5F93E-8B05-4FD5-A342-A9262D25EBF5}">
-  <ds:schemaRefs>
-    <ds:schemaRef ds:uri="http://schemas.microsoft.com/sharepoint/v3/contenttype/forms"/>
-  </ds:schemaRefs>
-</ds:datastoreItem>
-</file>
-
-<file path=customXml/itemProps3.xml><?xml version="1.0" encoding="utf-8"?>
-<ds:datastoreItem xmlns:ds="http://schemas.openxmlformats.org/officeDocument/2006/customXml" ds:itemID="{8C35085A-48E6-432D-BE61-01DE8B0FD0D2}">
-  <ds:schemaRefs>
-    <ds:schemaRef ds:uri="http://purl.org/dc/elements/1.1/"/>
-    <ds:schemaRef ds:uri="http://schemas.microsoft.com/office/2006/documentManagement/types"/>
-    <ds:schemaRef ds:uri="http://schemas.openxmlformats.org/package/2006/metadata/core-properties"/>
-    <ds:schemaRef ds:uri="http://schemas.microsoft.com/office/2006/metadata/properties"/>
-    <ds:schemaRef ds:uri="http://purl.org/dc/dcmitype/"/>
-    <ds:schemaRef ds:uri="http://purl.org/dc/terms/"/>
-    <ds:schemaRef ds:uri="http://www.w3.org/XML/1998/namespace"/>
-    <ds:schemaRef ds:uri="http://schemas.microsoft.com/office/infopath/2007/PartnerControls"/>
-    <ds:schemaRef ds:uri="68f14a89-5ccd-4d49-ad62-26850b52acdb"/>
-  </ds:schemaRefs>
-</ds:datastoreItem>
 </file>
</xml_diff>